<commit_message>
Final version of the document
</commit_message>
<xml_diff>
--- a/Manuscript/Conclusions/figures/PhDStefanoDiagram.pptx
+++ b/Manuscript/Conclusions/figures/PhDStefanoDiagram.pptx
@@ -261,7 +261,7 @@
           <a:p>
             <a:fld id="{B1986C5E-168B-4520-B64D-2E78D4859AA2}" type="datetimeFigureOut">
               <a:rPr lang="es-ES" smtClean="0"/>
-              <a:t>3/12/23</a:t>
+              <a:t>13/12/23</a:t>
             </a:fld>
             <a:endParaRPr lang="es-ES"/>
           </a:p>
@@ -461,7 +461,7 @@
           <a:p>
             <a:fld id="{B1986C5E-168B-4520-B64D-2E78D4859AA2}" type="datetimeFigureOut">
               <a:rPr lang="es-ES" smtClean="0"/>
-              <a:t>3/12/23</a:t>
+              <a:t>13/12/23</a:t>
             </a:fld>
             <a:endParaRPr lang="es-ES"/>
           </a:p>
@@ -671,7 +671,7 @@
           <a:p>
             <a:fld id="{B1986C5E-168B-4520-B64D-2E78D4859AA2}" type="datetimeFigureOut">
               <a:rPr lang="es-ES" smtClean="0"/>
-              <a:t>3/12/23</a:t>
+              <a:t>13/12/23</a:t>
             </a:fld>
             <a:endParaRPr lang="es-ES"/>
           </a:p>
@@ -871,7 +871,7 @@
           <a:p>
             <a:fld id="{B1986C5E-168B-4520-B64D-2E78D4859AA2}" type="datetimeFigureOut">
               <a:rPr lang="es-ES" smtClean="0"/>
-              <a:t>3/12/23</a:t>
+              <a:t>13/12/23</a:t>
             </a:fld>
             <a:endParaRPr lang="es-ES"/>
           </a:p>
@@ -1147,7 +1147,7 @@
           <a:p>
             <a:fld id="{B1986C5E-168B-4520-B64D-2E78D4859AA2}" type="datetimeFigureOut">
               <a:rPr lang="es-ES" smtClean="0"/>
-              <a:t>3/12/23</a:t>
+              <a:t>13/12/23</a:t>
             </a:fld>
             <a:endParaRPr lang="es-ES"/>
           </a:p>
@@ -1415,7 +1415,7 @@
           <a:p>
             <a:fld id="{B1986C5E-168B-4520-B64D-2E78D4859AA2}" type="datetimeFigureOut">
               <a:rPr lang="es-ES" smtClean="0"/>
-              <a:t>3/12/23</a:t>
+              <a:t>13/12/23</a:t>
             </a:fld>
             <a:endParaRPr lang="es-ES"/>
           </a:p>
@@ -1830,7 +1830,7 @@
           <a:p>
             <a:fld id="{B1986C5E-168B-4520-B64D-2E78D4859AA2}" type="datetimeFigureOut">
               <a:rPr lang="es-ES" smtClean="0"/>
-              <a:t>3/12/23</a:t>
+              <a:t>13/12/23</a:t>
             </a:fld>
             <a:endParaRPr lang="es-ES"/>
           </a:p>
@@ -1972,7 +1972,7 @@
           <a:p>
             <a:fld id="{B1986C5E-168B-4520-B64D-2E78D4859AA2}" type="datetimeFigureOut">
               <a:rPr lang="es-ES" smtClean="0"/>
-              <a:t>3/12/23</a:t>
+              <a:t>13/12/23</a:t>
             </a:fld>
             <a:endParaRPr lang="es-ES"/>
           </a:p>
@@ -2085,7 +2085,7 @@
           <a:p>
             <a:fld id="{B1986C5E-168B-4520-B64D-2E78D4859AA2}" type="datetimeFigureOut">
               <a:rPr lang="es-ES" smtClean="0"/>
-              <a:t>3/12/23</a:t>
+              <a:t>13/12/23</a:t>
             </a:fld>
             <a:endParaRPr lang="es-ES"/>
           </a:p>
@@ -2398,7 +2398,7 @@
           <a:p>
             <a:fld id="{B1986C5E-168B-4520-B64D-2E78D4859AA2}" type="datetimeFigureOut">
               <a:rPr lang="es-ES" smtClean="0"/>
-              <a:t>3/12/23</a:t>
+              <a:t>13/12/23</a:t>
             </a:fld>
             <a:endParaRPr lang="es-ES"/>
           </a:p>
@@ -2687,7 +2687,7 @@
           <a:p>
             <a:fld id="{B1986C5E-168B-4520-B64D-2E78D4859AA2}" type="datetimeFigureOut">
               <a:rPr lang="es-ES" smtClean="0"/>
-              <a:t>3/12/23</a:t>
+              <a:t>13/12/23</a:t>
             </a:fld>
             <a:endParaRPr lang="es-ES"/>
           </a:p>
@@ -2930,7 +2930,7 @@
           <a:p>
             <a:fld id="{B1986C5E-168B-4520-B64D-2E78D4859AA2}" type="datetimeFigureOut">
               <a:rPr lang="es-ES" smtClean="0"/>
-              <a:t>3/12/23</a:t>
+              <a:t>13/12/23</a:t>
             </a:fld>
             <a:endParaRPr lang="es-ES"/>
           </a:p>
@@ -3361,8 +3361,8 @@
         </p:nvSpPr>
         <p:spPr>
           <a:xfrm>
-            <a:off x="7356770" y="1053517"/>
-            <a:ext cx="1935011" cy="572655"/>
+            <a:off x="7304073" y="1053516"/>
+            <a:ext cx="2196000" cy="576000"/>
           </a:xfrm>
           <a:prstGeom prst="roundRect">
             <a:avLst/>
@@ -3415,7 +3415,7 @@
         </p:nvSpPr>
         <p:spPr>
           <a:xfrm>
-            <a:off x="3522179" y="746547"/>
+            <a:off x="3522179" y="796242"/>
             <a:ext cx="955963" cy="355601"/>
           </a:xfrm>
           <a:prstGeom prst="roundRect">
@@ -3462,7 +3462,7 @@
         </p:nvSpPr>
         <p:spPr>
           <a:xfrm>
-            <a:off x="3522179" y="1321713"/>
+            <a:off x="3522179" y="1291896"/>
             <a:ext cx="955963" cy="355601"/>
           </a:xfrm>
           <a:prstGeom prst="roundRect">
@@ -3509,8 +3509,8 @@
         </p:nvSpPr>
         <p:spPr>
           <a:xfrm>
-            <a:off x="7356769" y="2080484"/>
-            <a:ext cx="1935011" cy="1445082"/>
+            <a:off x="7304073" y="2080484"/>
+            <a:ext cx="2196000" cy="1476000"/>
           </a:xfrm>
           <a:prstGeom prst="roundRect">
             <a:avLst>
@@ -3577,11 +3577,13 @@
         </p:nvCxnSpPr>
         <p:spPr>
           <a:xfrm>
-            <a:off x="6788725" y="2137350"/>
-            <a:ext cx="685809" cy="1146626"/>
+            <a:off x="6895910" y="2168814"/>
+            <a:ext cx="534163" cy="1115162"/>
           </a:xfrm>
           <a:prstGeom prst="curvedConnector3">
-            <a:avLst/>
+            <a:avLst>
+              <a:gd name="adj1" fmla="val 33254"/>
+            </a:avLst>
           </a:prstGeom>
           <a:ln>
             <a:solidFill>
@@ -3619,8 +3621,8 @@
         </p:nvSpPr>
         <p:spPr>
           <a:xfrm>
-            <a:off x="5181606" y="2646777"/>
-            <a:ext cx="1607119" cy="819155"/>
+            <a:off x="5131910" y="2838963"/>
+            <a:ext cx="1764000" cy="720000"/>
           </a:xfrm>
           <a:prstGeom prst="roundRect">
             <a:avLst/>
@@ -3647,15 +3649,7 @@
             <a:pPr algn="ctr"/>
             <a:r>
               <a:rPr lang="en-US" sz="1600" dirty="0"/>
-              <a:t>C3: </a:t>
-            </a:r>
-            <a:r>
-              <a:rPr lang="en-US" sz="1600" i="1" dirty="0"/>
-              <a:t>CleAR</a:t>
-            </a:r>
-            <a:r>
-              <a:rPr lang="en-US" sz="1600" dirty="0"/>
-              <a:t> architecture</a:t>
+              <a:t>C3: Architecture definition</a:t>
             </a:r>
           </a:p>
         </p:txBody>
@@ -3674,8 +3668,8 @@
         </p:nvSpPr>
         <p:spPr>
           <a:xfrm>
-            <a:off x="5181607" y="738909"/>
-            <a:ext cx="1607119" cy="942105"/>
+            <a:off x="5131910" y="848238"/>
+            <a:ext cx="1764000" cy="720000"/>
           </a:xfrm>
           <a:prstGeom prst="roundRect">
             <a:avLst/>
@@ -3702,7 +3696,7 @@
             <a:pPr algn="ctr"/>
             <a:r>
               <a:rPr lang="en-US" sz="1600" dirty="0"/>
-              <a:t>C1: SotA in AR</a:t>
+              <a:t>C1: SotA in Collaborative AR</a:t>
             </a:r>
           </a:p>
         </p:txBody>
@@ -3721,8 +3715,8 @@
         </p:nvSpPr>
         <p:spPr>
           <a:xfrm>
-            <a:off x="5181606" y="1727772"/>
-            <a:ext cx="1607119" cy="819155"/>
+            <a:off x="5131910" y="1808814"/>
+            <a:ext cx="1764000" cy="720000"/>
           </a:xfrm>
           <a:prstGeom prst="roundRect">
             <a:avLst/>
@@ -3749,7 +3743,7 @@
             <a:pPr algn="ctr"/>
             <a:r>
               <a:rPr lang="en-US" sz="1600" dirty="0"/>
-              <a:t>C2: Orkestra Library</a:t>
+              <a:t>C2: Multi-user AR library</a:t>
             </a:r>
           </a:p>
         </p:txBody>
@@ -3768,7 +3762,7 @@
         </p:nvSpPr>
         <p:spPr>
           <a:xfrm>
-            <a:off x="3522179" y="1956513"/>
+            <a:off x="3522179" y="1986330"/>
             <a:ext cx="955963" cy="355601"/>
           </a:xfrm>
           <a:prstGeom prst="roundRect">
@@ -3815,8 +3809,8 @@
         </p:nvSpPr>
         <p:spPr>
           <a:xfrm>
-            <a:off x="7474534" y="3080486"/>
-            <a:ext cx="1780302" cy="406980"/>
+            <a:off x="7430073" y="3080486"/>
+            <a:ext cx="1944000" cy="406980"/>
           </a:xfrm>
           <a:prstGeom prst="roundRect">
             <a:avLst/>
@@ -3873,11 +3867,13 @@
         </p:nvCxnSpPr>
         <p:spPr>
           <a:xfrm flipV="1">
-            <a:off x="6788725" y="2803025"/>
-            <a:ext cx="568044" cy="253330"/>
+            <a:off x="6895910" y="2818484"/>
+            <a:ext cx="408163" cy="380479"/>
           </a:xfrm>
           <a:prstGeom prst="curvedConnector3">
-            <a:avLst/>
+            <a:avLst>
+              <a:gd name="adj1" fmla="val 50000"/>
+            </a:avLst>
           </a:prstGeom>
           <a:ln>
             <a:solidFill>
@@ -3915,7 +3911,7 @@
         </p:nvSpPr>
         <p:spPr>
           <a:xfrm>
-            <a:off x="3522179" y="2591313"/>
+            <a:off x="3522179" y="2750337"/>
             <a:ext cx="955963" cy="355601"/>
           </a:xfrm>
           <a:prstGeom prst="roundRect">
@@ -3962,7 +3958,7 @@
         </p:nvSpPr>
         <p:spPr>
           <a:xfrm>
-            <a:off x="3522179" y="3166479"/>
+            <a:off x="3522179" y="3232738"/>
             <a:ext cx="955963" cy="355601"/>
           </a:xfrm>
           <a:prstGeom prst="roundRect">
@@ -4009,8 +4005,8 @@
         </p:nvSpPr>
         <p:spPr>
           <a:xfrm>
-            <a:off x="5181606" y="3620637"/>
-            <a:ext cx="1607119" cy="979072"/>
+            <a:off x="5131910" y="3799539"/>
+            <a:ext cx="1764000" cy="720000"/>
           </a:xfrm>
           <a:prstGeom prst="roundRect">
             <a:avLst/>
@@ -4037,15 +4033,7 @@
             <a:pPr algn="ctr"/>
             <a:r>
               <a:rPr lang="en-US" sz="1600" dirty="0"/>
-              <a:t>C4: </a:t>
-            </a:r>
-            <a:r>
-              <a:rPr lang="en-US" sz="1600" i="1" dirty="0"/>
-              <a:t>ARoundTheWorld</a:t>
-            </a:r>
-            <a:r>
-              <a:rPr lang="en-US" sz="1600" dirty="0"/>
-              <a:t> implementation and validation</a:t>
+              <a:t>C4: Implementation and validation</a:t>
             </a:r>
           </a:p>
         </p:txBody>
@@ -4064,7 +4052,7 @@
         </p:nvSpPr>
         <p:spPr>
           <a:xfrm>
-            <a:off x="3522179" y="3652194"/>
+            <a:off x="3522179" y="3774773"/>
             <a:ext cx="955963" cy="355601"/>
           </a:xfrm>
           <a:prstGeom prst="roundRect">
@@ -4111,7 +4099,7 @@
         </p:nvSpPr>
         <p:spPr>
           <a:xfrm>
-            <a:off x="3522179" y="4217419"/>
+            <a:off x="3522179" y="4257175"/>
             <a:ext cx="955963" cy="355601"/>
           </a:xfrm>
           <a:prstGeom prst="roundRect">
@@ -4158,8 +4146,8 @@
         </p:nvSpPr>
         <p:spPr>
           <a:xfrm>
-            <a:off x="7356770" y="3602796"/>
-            <a:ext cx="1935010" cy="1021007"/>
+            <a:off x="7304073" y="3642552"/>
+            <a:ext cx="2196000" cy="1021007"/>
           </a:xfrm>
           <a:prstGeom prst="roundRect">
             <a:avLst>
@@ -4208,7 +4196,7 @@
         <p:spPr>
           <a:xfrm>
             <a:off x="7232073" y="738909"/>
-            <a:ext cx="2142836" cy="942109"/>
+            <a:ext cx="2340000" cy="942109"/>
           </a:xfrm>
           <a:prstGeom prst="roundRect">
             <a:avLst/>
@@ -4240,6 +4228,7 @@
           <a:bodyPr lIns="0" tIns="0" rIns="0" bIns="0" rtlCol="0" anchor="t" anchorCtr="0"/>
           <a:lstStyle/>
           <a:p>
+            <a:pPr algn="ctr"/>
             <a:r>
               <a:rPr lang="en-US" sz="1600" dirty="0">
                 <a:solidFill>
@@ -4267,8 +4256,8 @@
         </p:nvSpPr>
         <p:spPr>
           <a:xfrm>
-            <a:off x="7232073" y="1787406"/>
-            <a:ext cx="2142836" cy="2903864"/>
+            <a:off x="7232073" y="1727772"/>
+            <a:ext cx="2340000" cy="2988000"/>
           </a:xfrm>
           <a:prstGeom prst="roundRect">
             <a:avLst>
@@ -4302,6 +4291,7 @@
           <a:bodyPr lIns="0" tIns="0" rIns="0" bIns="0" rtlCol="0" anchor="t" anchorCtr="0"/>
           <a:lstStyle/>
           <a:p>
+            <a:pPr algn="ctr"/>
             <a:r>
               <a:rPr lang="en-US" sz="1600" dirty="0">
                 <a:solidFill>
@@ -4365,7 +4355,7 @@
         </p:nvSpPr>
         <p:spPr>
           <a:xfrm>
-            <a:off x="5181605" y="419102"/>
+            <a:off x="5210351" y="419102"/>
             <a:ext cx="1607119" cy="338554"/>
           </a:xfrm>
           <a:prstGeom prst="rect">
@@ -4401,7 +4391,7 @@
         </p:nvSpPr>
         <p:spPr>
           <a:xfrm>
-            <a:off x="7232074" y="419102"/>
+            <a:off x="7330655" y="419102"/>
             <a:ext cx="2142836" cy="338554"/>
           </a:xfrm>
           <a:prstGeom prst="rect">
@@ -4440,8 +4430,8 @@
         </p:nvCxnSpPr>
         <p:spPr>
           <a:xfrm flipH="1" flipV="1">
-            <a:off x="4478142" y="3829995"/>
-            <a:ext cx="703464" cy="280178"/>
+            <a:off x="4478142" y="3952574"/>
+            <a:ext cx="653768" cy="206965"/>
           </a:xfrm>
           <a:prstGeom prst="straightConnector1">
             <a:avLst/>
@@ -4483,8 +4473,8 @@
         </p:nvCxnSpPr>
         <p:spPr>
           <a:xfrm flipH="1">
-            <a:off x="4478142" y="4110173"/>
-            <a:ext cx="703464" cy="285047"/>
+            <a:off x="4478142" y="4159539"/>
+            <a:ext cx="653768" cy="275437"/>
           </a:xfrm>
           <a:prstGeom prst="straightConnector1">
             <a:avLst/>
@@ -4526,8 +4516,8 @@
         </p:nvCxnSpPr>
         <p:spPr>
           <a:xfrm flipH="1" flipV="1">
-            <a:off x="4478142" y="2769114"/>
-            <a:ext cx="703464" cy="287241"/>
+            <a:off x="4478142" y="2928138"/>
+            <a:ext cx="653768" cy="270825"/>
           </a:xfrm>
           <a:prstGeom prst="straightConnector1">
             <a:avLst/>
@@ -4569,8 +4559,8 @@
         </p:nvCxnSpPr>
         <p:spPr>
           <a:xfrm flipH="1">
-            <a:off x="4478142" y="3056355"/>
-            <a:ext cx="703464" cy="287925"/>
+            <a:off x="4478142" y="3198963"/>
+            <a:ext cx="653768" cy="211576"/>
           </a:xfrm>
           <a:prstGeom prst="straightConnector1">
             <a:avLst/>
@@ -4612,8 +4602,8 @@
         </p:nvCxnSpPr>
         <p:spPr>
           <a:xfrm>
-            <a:off x="6788726" y="1209962"/>
-            <a:ext cx="443347" cy="2"/>
+            <a:off x="6895910" y="1208238"/>
+            <a:ext cx="336163" cy="1726"/>
           </a:xfrm>
           <a:prstGeom prst="straightConnector1">
             <a:avLst/>
@@ -4655,8 +4645,8 @@
         </p:nvCxnSpPr>
         <p:spPr>
           <a:xfrm flipH="1">
-            <a:off x="4478142" y="1209962"/>
-            <a:ext cx="703465" cy="289552"/>
+            <a:off x="4478142" y="1208238"/>
+            <a:ext cx="653768" cy="261459"/>
           </a:xfrm>
           <a:prstGeom prst="straightConnector1">
             <a:avLst/>
@@ -4698,8 +4688,8 @@
         </p:nvCxnSpPr>
         <p:spPr>
           <a:xfrm flipH="1" flipV="1">
-            <a:off x="4478142" y="924348"/>
-            <a:ext cx="703465" cy="285614"/>
+            <a:off x="4478142" y="974043"/>
+            <a:ext cx="653768" cy="234195"/>
           </a:xfrm>
           <a:prstGeom prst="straightConnector1">
             <a:avLst/>
@@ -4740,9 +4730,9 @@
           <p:nvPr/>
         </p:nvCxnSpPr>
         <p:spPr>
-          <a:xfrm>
-            <a:off x="6788725" y="4110173"/>
-            <a:ext cx="568045" cy="3127"/>
+          <a:xfrm flipV="1">
+            <a:off x="6895910" y="4153056"/>
+            <a:ext cx="408163" cy="6483"/>
           </a:xfrm>
           <a:prstGeom prst="straightConnector1">
             <a:avLst/>
@@ -4784,8 +4774,8 @@
         </p:nvCxnSpPr>
         <p:spPr>
           <a:xfrm flipH="1" flipV="1">
-            <a:off x="4478142" y="2134314"/>
-            <a:ext cx="703464" cy="3036"/>
+            <a:off x="4478142" y="2164131"/>
+            <a:ext cx="653768" cy="4683"/>
           </a:xfrm>
           <a:prstGeom prst="straightConnector1">
             <a:avLst/>

</xml_diff>